<commit_message>
Excel and power point updates
</commit_message>
<xml_diff>
--- a/Jan's food place.pptx
+++ b/Jan's food place.pptx
@@ -12,6 +12,7 @@
     <p:sldId id="263" r:id="rId6"/>
     <p:sldId id="265" r:id="rId7"/>
     <p:sldId id="267" r:id="rId8"/>
+    <p:sldId id="277" r:id="rId9"/>
   </p:sldIdLst>
   <p:sldSz cx="9144000" cy="6858000" type="screen4x3"/>
   <p:notesSz cx="6858000" cy="9144000"/>
@@ -6143,19 +6144,8 @@
                 <a:latin typeface="AMGDT_IV25" pitchFamily="2" charset="0"/>
                 <a:ea typeface="Adobe Fangsong Std R" pitchFamily="18" charset="-128"/>
               </a:rPr>
-              <a:t>Jan </a:t>
-            </a:r>
-            <a:r>
-              <a:rPr lang="en-US" sz="2000" dirty="0" smtClean="0">
-                <a:latin typeface="AMGDT_IV25" pitchFamily="2" charset="0"/>
-                <a:ea typeface="Adobe Fangsong Std R" pitchFamily="18" charset="-128"/>
-              </a:rPr>
-              <a:t>Chau</a:t>
-            </a:r>
-            <a:endParaRPr lang="en-US" sz="2000" dirty="0" smtClean="0">
-              <a:latin typeface="AMGDT_IV25" pitchFamily="2" charset="0"/>
-              <a:ea typeface="Adobe Fangsong Std R" pitchFamily="18" charset="-128"/>
-            </a:endParaRPr>
+              <a:t>Jan Chau</a:t>
+            </a:r>
           </a:p>
           <a:p>
             <a:pPr>
@@ -6436,7 +6426,7 @@
       </p:sp>
       <p:pic>
         <p:nvPicPr>
-          <p:cNvPr id="1026" name="Picture 2" descr="C:\Users\Ryan\Desktop\Jaggy Presentation\Builder.png"/>
+          <p:cNvPr id="3" name="Picture 2" descr="C:\Users\Ryan\Desktop\Jaggy Presentation\Builder.png"/>
           <p:cNvPicPr>
             <a:picLocks noChangeAspect="1" noChangeArrowheads="1"/>
           </p:cNvPicPr>
@@ -6451,8 +6441,8 @@
         </p:blipFill>
         <p:spPr bwMode="auto">
           <a:xfrm>
-            <a:off x="1219200" y="1676400"/>
-            <a:ext cx="6629400" cy="4613704"/>
+            <a:off x="1000100" y="1714488"/>
+            <a:ext cx="7048500" cy="4905375"/>
           </a:xfrm>
           <a:prstGeom prst="rect">
             <a:avLst/>
@@ -6512,7 +6502,7 @@
       </p:sp>
       <p:pic>
         <p:nvPicPr>
-          <p:cNvPr id="2050" name="Picture 2" descr="C:\Users\Ryan\Desktop\Jaggy Presentation\Decorator.png"/>
+          <p:cNvPr id="3" name="Picture 2" descr="C:\Users\Ryan\Desktop\Jaggy Presentation\Decorator.png"/>
           <p:cNvPicPr>
             <a:picLocks noChangeAspect="1" noChangeArrowheads="1"/>
           </p:cNvPicPr>
@@ -6527,8 +6517,8 @@
         </p:blipFill>
         <p:spPr bwMode="auto">
           <a:xfrm>
-            <a:off x="1828800" y="1676400"/>
-            <a:ext cx="5486400" cy="4540792"/>
+            <a:off x="1643042" y="1714488"/>
+            <a:ext cx="5915025" cy="4572000"/>
           </a:xfrm>
           <a:prstGeom prst="rect">
             <a:avLst/>
@@ -6586,7 +6576,7 @@
       </p:sp>
       <p:pic>
         <p:nvPicPr>
-          <p:cNvPr id="3074" name="Picture 2" descr="C:\Users\Ryan\Desktop\Jaggy Presentation\Facade.png"/>
+          <p:cNvPr id="3" name="Picture 2" descr="C:\Users\Ryan\Desktop\Jaggy Presentation\Facade.png"/>
           <p:cNvPicPr>
             <a:picLocks noChangeAspect="1" noChangeArrowheads="1"/>
           </p:cNvPicPr>
@@ -6601,8 +6591,8 @@
         </p:blipFill>
         <p:spPr bwMode="auto">
           <a:xfrm>
-            <a:off x="533400" y="2209800"/>
-            <a:ext cx="8058150" cy="3590925"/>
+            <a:off x="500034" y="1857364"/>
+            <a:ext cx="8201024" cy="4006893"/>
           </a:xfrm>
           <a:prstGeom prst="rect">
             <a:avLst/>
@@ -6660,7 +6650,7 @@
       </p:sp>
       <p:pic>
         <p:nvPicPr>
-          <p:cNvPr id="4098" name="Picture 2" descr="C:\Users\Ryan\Desktop\Jaggy Presentation\Factory.png"/>
+          <p:cNvPr id="3" name="Picture 2" descr="C:\Users\Ryan\Desktop\Jaggy Presentation\Factory.png"/>
           <p:cNvPicPr>
             <a:picLocks noChangeAspect="1" noChangeArrowheads="1"/>
           </p:cNvPicPr>
@@ -6675,8 +6665,8 @@
         </p:blipFill>
         <p:spPr bwMode="auto">
           <a:xfrm>
-            <a:off x="685800" y="2133600"/>
-            <a:ext cx="7743825" cy="3657600"/>
+            <a:off x="642910" y="2285992"/>
+            <a:ext cx="7896225" cy="3486150"/>
           </a:xfrm>
           <a:prstGeom prst="rect">
             <a:avLst/>
@@ -6734,7 +6724,7 @@
       </p:sp>
       <p:pic>
         <p:nvPicPr>
-          <p:cNvPr id="5122" name="Picture 2" descr="C:\Users\Ryan\Desktop\Jaggy Presentation\Template.png"/>
+          <p:cNvPr id="3" name="Picture 2" descr="C:\Users\Ryan\Desktop\Jaggy Presentation\Template.png"/>
           <p:cNvPicPr>
             <a:picLocks noChangeAspect="1" noChangeArrowheads="1"/>
           </p:cNvPicPr>
@@ -6749,8 +6739,88 @@
         </p:blipFill>
         <p:spPr bwMode="auto">
           <a:xfrm>
-            <a:off x="1371600" y="1905000"/>
-            <a:ext cx="6210300" cy="4095750"/>
+            <a:off x="1428728" y="2000240"/>
+            <a:ext cx="6210300" cy="4019550"/>
+          </a:xfrm>
+          <a:prstGeom prst="rect">
+            <a:avLst/>
+          </a:prstGeom>
+          <a:noFill/>
+        </p:spPr>
+      </p:pic>
+    </p:spTree>
+  </p:cSld>
+  <p:clrMapOvr>
+    <a:masterClrMapping/>
+  </p:clrMapOvr>
+</p:sld>
+</file>
+
+<file path=ppt/slides/slide8.xml><?xml version="1.0" encoding="utf-8"?>
+<p:sld xmlns:a="http://schemas.openxmlformats.org/drawingml/2006/main" xmlns:r="http://schemas.openxmlformats.org/officeDocument/2006/relationships" xmlns:p="http://schemas.openxmlformats.org/presentationml/2006/main">
+  <p:cSld>
+    <p:spTree>
+      <p:nvGrpSpPr>
+        <p:cNvPr id="1" name=""/>
+        <p:cNvGrpSpPr/>
+        <p:nvPr/>
+      </p:nvGrpSpPr>
+      <p:grpSpPr>
+        <a:xfrm>
+          <a:off x="0" y="0"/>
+          <a:ext cx="0" cy="0"/>
+          <a:chOff x="0" y="0"/>
+          <a:chExt cx="0" cy="0"/>
+        </a:xfrm>
+      </p:grpSpPr>
+      <p:sp>
+        <p:nvSpPr>
+          <p:cNvPr id="2" name="Title 1"/>
+          <p:cNvSpPr>
+            <a:spLocks noGrp="1"/>
+          </p:cNvSpPr>
+          <p:nvPr>
+            <p:ph type="title"/>
+          </p:nvPr>
+        </p:nvSpPr>
+        <p:spPr/>
+        <p:txBody>
+          <a:bodyPr>
+            <a:normAutofit/>
+          </a:bodyPr>
+          <a:lstStyle/>
+          <a:p>
+            <a:r>
+              <a:rPr lang="en-CA" smtClean="0"/>
+              <a:t>Project Class </a:t>
+            </a:r>
+            <a:r>
+              <a:rPr lang="en-CA" dirty="0" smtClean="0"/>
+              <a:t>Diagram</a:t>
+            </a:r>
+            <a:endParaRPr lang="en-CA" dirty="0"/>
+          </a:p>
+        </p:txBody>
+      </p:sp>
+      <p:pic>
+        <p:nvPicPr>
+          <p:cNvPr id="1026" name="Picture 2" descr="C:\Users\Ryan\Desktop\Jaggy Presentation\Class Diagram.png"/>
+          <p:cNvPicPr>
+            <a:picLocks noChangeAspect="1" noChangeArrowheads="1"/>
+          </p:cNvPicPr>
+          <p:nvPr/>
+        </p:nvPicPr>
+        <p:blipFill>
+          <a:blip r:embed="rId2"/>
+          <a:srcRect/>
+          <a:stretch>
+            <a:fillRect/>
+          </a:stretch>
+        </p:blipFill>
+        <p:spPr bwMode="auto">
+          <a:xfrm>
+            <a:off x="357158" y="2000240"/>
+            <a:ext cx="8429684" cy="3873323"/>
           </a:xfrm>
           <a:prstGeom prst="rect">
             <a:avLst/>

</xml_diff>